<commit_message>
Modificando o diagrama de negócio e adicionando a minha calculadora financeira
</commit_message>
<xml_diff>
--- a/Diagrama de Negócio.pptx
+++ b/Diagrama de Negócio.pptx
@@ -104,6 +104,11 @@
       </a:defRPr>
     </a:lvl9pPr>
   </p:defaultTextStyle>
+  <p:extLst>
+    <p:ext uri="{EFAFB233-063F-42B5-8137-9DF3F51BA10A}">
+      <p15:sldGuideLst xmlns:p15="http://schemas.microsoft.com/office/powerpoint/2012/main"/>
+    </p:ext>
+  </p:extLst>
 </p:presentation>
 </file>
 
@@ -526,7 +531,7 @@
           <a:p>
             <a:fld id="{E7193381-3774-4A54-844A-BEDC7D53D906}" type="datetimeFigureOut">
               <a:rPr lang="ko-KR" altLang="en-US" smtClean="0"/>
-              <a:t>2024-08-25</a:t>
+              <a:t>2024-09-04</a:t>
             </a:fld>
             <a:endParaRPr lang="ko-KR" altLang="en-US"/>
           </a:p>
@@ -726,7 +731,7 @@
           <a:p>
             <a:fld id="{E7193381-3774-4A54-844A-BEDC7D53D906}" type="datetimeFigureOut">
               <a:rPr lang="ko-KR" altLang="en-US" smtClean="0"/>
-              <a:t>2024-08-25</a:t>
+              <a:t>2024-09-04</a:t>
             </a:fld>
             <a:endParaRPr lang="ko-KR" altLang="en-US"/>
           </a:p>
@@ -936,7 +941,7 @@
           <a:p>
             <a:fld id="{E7193381-3774-4A54-844A-BEDC7D53D906}" type="datetimeFigureOut">
               <a:rPr lang="ko-KR" altLang="en-US" smtClean="0"/>
-              <a:t>2024-08-25</a:t>
+              <a:t>2024-09-04</a:t>
             </a:fld>
             <a:endParaRPr lang="ko-KR" altLang="en-US"/>
           </a:p>
@@ -1136,7 +1141,7 @@
           <a:p>
             <a:fld id="{E7193381-3774-4A54-844A-BEDC7D53D906}" type="datetimeFigureOut">
               <a:rPr lang="ko-KR" altLang="en-US" smtClean="0"/>
-              <a:t>2024-08-25</a:t>
+              <a:t>2024-09-04</a:t>
             </a:fld>
             <a:endParaRPr lang="ko-KR" altLang="en-US"/>
           </a:p>
@@ -1412,7 +1417,7 @@
           <a:p>
             <a:fld id="{E7193381-3774-4A54-844A-BEDC7D53D906}" type="datetimeFigureOut">
               <a:rPr lang="ko-KR" altLang="en-US" smtClean="0"/>
-              <a:t>2024-08-25</a:t>
+              <a:t>2024-09-04</a:t>
             </a:fld>
             <a:endParaRPr lang="ko-KR" altLang="en-US"/>
           </a:p>
@@ -1680,7 +1685,7 @@
           <a:p>
             <a:fld id="{E7193381-3774-4A54-844A-BEDC7D53D906}" type="datetimeFigureOut">
               <a:rPr lang="ko-KR" altLang="en-US" smtClean="0"/>
-              <a:t>2024-08-25</a:t>
+              <a:t>2024-09-04</a:t>
             </a:fld>
             <a:endParaRPr lang="ko-KR" altLang="en-US"/>
           </a:p>
@@ -2095,7 +2100,7 @@
           <a:p>
             <a:fld id="{E7193381-3774-4A54-844A-BEDC7D53D906}" type="datetimeFigureOut">
               <a:rPr lang="ko-KR" altLang="en-US" smtClean="0"/>
-              <a:t>2024-08-25</a:t>
+              <a:t>2024-09-04</a:t>
             </a:fld>
             <a:endParaRPr lang="ko-KR" altLang="en-US"/>
           </a:p>
@@ -2237,7 +2242,7 @@
           <a:p>
             <a:fld id="{E7193381-3774-4A54-844A-BEDC7D53D906}" type="datetimeFigureOut">
               <a:rPr lang="ko-KR" altLang="en-US" smtClean="0"/>
-              <a:t>2024-08-25</a:t>
+              <a:t>2024-09-04</a:t>
             </a:fld>
             <a:endParaRPr lang="ko-KR" altLang="en-US"/>
           </a:p>
@@ -2350,7 +2355,7 @@
           <a:p>
             <a:fld id="{E7193381-3774-4A54-844A-BEDC7D53D906}" type="datetimeFigureOut">
               <a:rPr lang="ko-KR" altLang="en-US" smtClean="0"/>
-              <a:t>2024-08-25</a:t>
+              <a:t>2024-09-04</a:t>
             </a:fld>
             <a:endParaRPr lang="ko-KR" altLang="en-US"/>
           </a:p>
@@ -2663,7 +2668,7 @@
           <a:p>
             <a:fld id="{E7193381-3774-4A54-844A-BEDC7D53D906}" type="datetimeFigureOut">
               <a:rPr lang="ko-KR" altLang="en-US" smtClean="0"/>
-              <a:t>2024-08-25</a:t>
+              <a:t>2024-09-04</a:t>
             </a:fld>
             <a:endParaRPr lang="ko-KR" altLang="en-US"/>
           </a:p>
@@ -2952,7 +2957,7 @@
           <a:p>
             <a:fld id="{E7193381-3774-4A54-844A-BEDC7D53D906}" type="datetimeFigureOut">
               <a:rPr lang="ko-KR" altLang="en-US" smtClean="0"/>
-              <a:t>2024-08-25</a:t>
+              <a:t>2024-09-04</a:t>
             </a:fld>
             <a:endParaRPr lang="ko-KR" altLang="en-US"/>
           </a:p>
@@ -3195,7 +3200,7 @@
           <a:p>
             <a:fld id="{E7193381-3774-4A54-844A-BEDC7D53D906}" type="datetimeFigureOut">
               <a:rPr lang="ko-KR" altLang="en-US" smtClean="0"/>
-              <a:t>2024-08-25</a:t>
+              <a:t>2024-09-04</a:t>
             </a:fld>
             <a:endParaRPr lang="ko-KR" altLang="en-US"/>
           </a:p>
@@ -3673,8 +3678,8 @@
         </p:nvSpPr>
         <p:spPr>
           <a:xfrm>
-            <a:off x="113892" y="205502"/>
-            <a:ext cx="4973560" cy="461665"/>
+            <a:off x="1073191" y="244330"/>
+            <a:ext cx="10045617" cy="461665"/>
           </a:xfrm>
           <a:prstGeom prst="rect">
             <a:avLst/>
@@ -3691,7 +3696,7 @@
               <a:rPr lang="pt-BR" altLang="ko-KR" sz="2400" dirty="0">
                 <a:latin typeface="Congenial SemiBold" panose="020F0502020204030204" pitchFamily="2" charset="0"/>
               </a:rPr>
-              <a:t>Diagrama de Negócio</a:t>
+              <a:t>Wynn – Soluções em monitoramento da fermentação de vinhos</a:t>
             </a:r>
             <a:endParaRPr lang="ko-KR" altLang="en-US" sz="2400" dirty="0">
               <a:latin typeface="Congenial SemiBold" panose="020F0502020204030204" pitchFamily="2" charset="0"/>
@@ -3713,7 +3718,7 @@
         </p:nvSpPr>
         <p:spPr>
           <a:xfrm>
-            <a:off x="291487" y="3655077"/>
+            <a:off x="242695" y="3655077"/>
             <a:ext cx="2229710" cy="276999"/>
           </a:xfrm>
           <a:prstGeom prst="rect">
@@ -4156,7 +4161,7 @@
         </p:blipFill>
         <p:spPr>
           <a:xfrm>
-            <a:off x="872602" y="2623229"/>
+            <a:off x="841626" y="2623229"/>
             <a:ext cx="1031848" cy="1031848"/>
           </a:xfrm>
           <a:prstGeom prst="rect">
@@ -4184,8 +4189,8 @@
             <a:chExt cx="840600" cy="423720"/>
           </a:xfrm>
         </p:grpSpPr>
-        <mc:AlternateContent xmlns:mc="http://schemas.openxmlformats.org/markup-compatibility/2006">
-          <mc:Choice xmlns:p14="http://schemas.microsoft.com/office/powerpoint/2010/main" Requires="p14">
+        <mc:AlternateContent xmlns:mc="http://schemas.openxmlformats.org/markup-compatibility/2006" xmlns:p14="http://schemas.microsoft.com/office/powerpoint/2010/main">
+          <mc:Choice Requires="p14">
             <p:contentPart p14:bwMode="auto" r:id="rId8">
               <p14:nvContentPartPr>
                 <p14:cNvPr id="1048" name="Tinta 1047">
@@ -4204,7 +4209,7 @@
               </p14:xfrm>
             </p:contentPart>
           </mc:Choice>
-          <mc:Fallback>
+          <mc:Fallback xmlns="">
             <p:pic>
               <p:nvPicPr>
                 <p:cNvPr id="1048" name="Tinta 1047">
@@ -4235,8 +4240,8 @@
             </p:pic>
           </mc:Fallback>
         </mc:AlternateContent>
-        <mc:AlternateContent xmlns:mc="http://schemas.openxmlformats.org/markup-compatibility/2006">
-          <mc:Choice xmlns:p14="http://schemas.microsoft.com/office/powerpoint/2010/main" Requires="p14">
+        <mc:AlternateContent xmlns:mc="http://schemas.openxmlformats.org/markup-compatibility/2006" xmlns:p14="http://schemas.microsoft.com/office/powerpoint/2010/main">
+          <mc:Choice Requires="p14">
             <p:contentPart p14:bwMode="auto" r:id="rId10">
               <p14:nvContentPartPr>
                 <p14:cNvPr id="1049" name="Tinta 1048">
@@ -4255,7 +4260,7 @@
               </p14:xfrm>
             </p:contentPart>
           </mc:Choice>
-          <mc:Fallback>
+          <mc:Fallback xmlns="">
             <p:pic>
               <p:nvPicPr>
                 <p:cNvPr id="1049" name="Tinta 1048">
@@ -4287,8 +4292,8 @@
           </mc:Fallback>
         </mc:AlternateContent>
       </p:grpSp>
-      <mc:AlternateContent xmlns:mc="http://schemas.openxmlformats.org/markup-compatibility/2006">
-        <mc:Choice xmlns:p14="http://schemas.microsoft.com/office/powerpoint/2010/main" Requires="p14">
+      <mc:AlternateContent xmlns:mc="http://schemas.openxmlformats.org/markup-compatibility/2006" xmlns:p14="http://schemas.microsoft.com/office/powerpoint/2010/main">
+        <mc:Choice Requires="p14">
           <p:contentPart p14:bwMode="auto" r:id="rId12">
             <p14:nvContentPartPr>
               <p14:cNvPr id="1059" name="Tinta 1058">
@@ -4307,7 +4312,7 @@
             </p14:xfrm>
           </p:contentPart>
         </mc:Choice>
-        <mc:Fallback>
+        <mc:Fallback xmlns="">
           <p:pic>
             <p:nvPicPr>
               <p:cNvPr id="1059" name="Tinta 1058">
@@ -4338,8 +4343,8 @@
           </p:pic>
         </mc:Fallback>
       </mc:AlternateContent>
-      <mc:AlternateContent xmlns:mc="http://schemas.openxmlformats.org/markup-compatibility/2006">
-        <mc:Choice xmlns:p14="http://schemas.microsoft.com/office/powerpoint/2010/main" Requires="p14">
+      <mc:AlternateContent xmlns:mc="http://schemas.openxmlformats.org/markup-compatibility/2006" xmlns:p14="http://schemas.microsoft.com/office/powerpoint/2010/main">
+        <mc:Choice Requires="p14">
           <p:contentPart p14:bwMode="auto" r:id="rId14">
             <p14:nvContentPartPr>
               <p14:cNvPr id="1063" name="Tinta 1062">
@@ -4358,7 +4363,7 @@
             </p14:xfrm>
           </p:contentPart>
         </mc:Choice>
-        <mc:Fallback>
+        <mc:Fallback xmlns="">
           <p:pic>
             <p:nvPicPr>
               <p:cNvPr id="1063" name="Tinta 1062">
@@ -4409,8 +4414,8 @@
             <a:chExt cx="796680" cy="108720"/>
           </a:xfrm>
         </p:grpSpPr>
-        <mc:AlternateContent xmlns:mc="http://schemas.openxmlformats.org/markup-compatibility/2006">
-          <mc:Choice xmlns:p14="http://schemas.microsoft.com/office/powerpoint/2010/main" Requires="p14">
+        <mc:AlternateContent xmlns:mc="http://schemas.openxmlformats.org/markup-compatibility/2006" xmlns:p14="http://schemas.microsoft.com/office/powerpoint/2010/main">
+          <mc:Choice Requires="p14">
             <p:contentPart p14:bwMode="auto" r:id="rId16">
               <p14:nvContentPartPr>
                 <p14:cNvPr id="1064" name="Tinta 1063">
@@ -4429,7 +4434,7 @@
               </p14:xfrm>
             </p:contentPart>
           </mc:Choice>
-          <mc:Fallback>
+          <mc:Fallback xmlns="">
             <p:pic>
               <p:nvPicPr>
                 <p:cNvPr id="1064" name="Tinta 1063">
@@ -4460,8 +4465,8 @@
             </p:pic>
           </mc:Fallback>
         </mc:AlternateContent>
-        <mc:AlternateContent xmlns:mc="http://schemas.openxmlformats.org/markup-compatibility/2006">
-          <mc:Choice xmlns:p14="http://schemas.microsoft.com/office/powerpoint/2010/main" Requires="p14">
+        <mc:AlternateContent xmlns:mc="http://schemas.openxmlformats.org/markup-compatibility/2006" xmlns:p14="http://schemas.microsoft.com/office/powerpoint/2010/main">
+          <mc:Choice Requires="p14">
             <p:contentPart p14:bwMode="auto" r:id="rId18">
               <p14:nvContentPartPr>
                 <p14:cNvPr id="1065" name="Tinta 1064">
@@ -4480,7 +4485,7 @@
               </p14:xfrm>
             </p:contentPart>
           </mc:Choice>
-          <mc:Fallback>
+          <mc:Fallback xmlns="">
             <p:pic>
               <p:nvPicPr>
                 <p:cNvPr id="1065" name="Tinta 1064">
@@ -4512,8 +4517,8 @@
           </mc:Fallback>
         </mc:AlternateContent>
       </p:grpSp>
-      <mc:AlternateContent xmlns:mc="http://schemas.openxmlformats.org/markup-compatibility/2006">
-        <mc:Choice xmlns:p14="http://schemas.microsoft.com/office/powerpoint/2010/main" Requires="p14">
+      <mc:AlternateContent xmlns:mc="http://schemas.openxmlformats.org/markup-compatibility/2006" xmlns:p14="http://schemas.microsoft.com/office/powerpoint/2010/main">
+        <mc:Choice Requires="p14">
           <p:contentPart p14:bwMode="auto" r:id="rId20">
             <p14:nvContentPartPr>
               <p14:cNvPr id="1067" name="Tinta 1066">
@@ -4532,7 +4537,7 @@
             </p14:xfrm>
           </p:contentPart>
         </mc:Choice>
-        <mc:Fallback>
+        <mc:Fallback xmlns="">
           <p:pic>
             <p:nvPicPr>
               <p:cNvPr id="1067" name="Tinta 1066">
@@ -4563,8 +4568,8 @@
           </p:pic>
         </mc:Fallback>
       </mc:AlternateContent>
-      <mc:AlternateContent xmlns:mc="http://schemas.openxmlformats.org/markup-compatibility/2006">
-        <mc:Choice xmlns:p14="http://schemas.microsoft.com/office/powerpoint/2010/main" Requires="p14">
+      <mc:AlternateContent xmlns:mc="http://schemas.openxmlformats.org/markup-compatibility/2006" xmlns:p14="http://schemas.microsoft.com/office/powerpoint/2010/main">
+        <mc:Choice Requires="p14">
           <p:contentPart p14:bwMode="auto" r:id="rId22">
             <p14:nvContentPartPr>
               <p14:cNvPr id="1073" name="Tinta 1072">
@@ -4583,7 +4588,7 @@
             </p14:xfrm>
           </p:contentPart>
         </mc:Choice>
-        <mc:Fallback>
+        <mc:Fallback xmlns="">
           <p:pic>
             <p:nvPicPr>
               <p:cNvPr id="1073" name="Tinta 1072">
@@ -4614,8 +4619,8 @@
           </p:pic>
         </mc:Fallback>
       </mc:AlternateContent>
-      <mc:AlternateContent xmlns:mc="http://schemas.openxmlformats.org/markup-compatibility/2006">
-        <mc:Choice xmlns:p14="http://schemas.microsoft.com/office/powerpoint/2010/main" Requires="p14">
+      <mc:AlternateContent xmlns:mc="http://schemas.openxmlformats.org/markup-compatibility/2006" xmlns:p14="http://schemas.microsoft.com/office/powerpoint/2010/main">
+        <mc:Choice Requires="p14">
           <p:contentPart p14:bwMode="auto" r:id="rId24">
             <p14:nvContentPartPr>
               <p14:cNvPr id="1085" name="Tinta 1084">
@@ -4634,7 +4639,7 @@
             </p14:xfrm>
           </p:contentPart>
         </mc:Choice>
-        <mc:Fallback>
+        <mc:Fallback xmlns="">
           <p:pic>
             <p:nvPicPr>
               <p:cNvPr id="1085" name="Tinta 1084">
@@ -4665,8 +4670,8 @@
           </p:pic>
         </mc:Fallback>
       </mc:AlternateContent>
-      <mc:AlternateContent xmlns:mc="http://schemas.openxmlformats.org/markup-compatibility/2006">
-        <mc:Choice xmlns:p14="http://schemas.microsoft.com/office/powerpoint/2010/main" Requires="p14">
+      <mc:AlternateContent xmlns:mc="http://schemas.openxmlformats.org/markup-compatibility/2006" xmlns:p14="http://schemas.microsoft.com/office/powerpoint/2010/main">
+        <mc:Choice Requires="p14">
           <p:contentPart p14:bwMode="auto" r:id="rId26">
             <p14:nvContentPartPr>
               <p14:cNvPr id="1089" name="Tinta 1088">
@@ -4685,7 +4690,7 @@
             </p14:xfrm>
           </p:contentPart>
         </mc:Choice>
-        <mc:Fallback>
+        <mc:Fallback xmlns="">
           <p:pic>
             <p:nvPicPr>
               <p:cNvPr id="1089" name="Tinta 1088">
@@ -4746,6 +4751,139 @@
           </a:prstGeom>
         </p:spPr>
       </p:pic>
+      <p:sp>
+        <p:nvSpPr>
+          <p:cNvPr id="3" name="CaixaDeTexto 2">
+            <a:extLst>
+              <a:ext uri="{FF2B5EF4-FFF2-40B4-BE49-F238E27FC236}">
+                <a16:creationId xmlns:a16="http://schemas.microsoft.com/office/drawing/2014/main" id="{1A2A70EF-FC69-FF8A-8C53-5067118A899A}"/>
+              </a:ext>
+            </a:extLst>
+          </p:cNvPr>
+          <p:cNvSpPr txBox="1"/>
+          <p:nvPr/>
+        </p:nvSpPr>
+        <p:spPr>
+          <a:xfrm>
+            <a:off x="345364" y="3957774"/>
+            <a:ext cx="1528110" cy="1107996"/>
+          </a:xfrm>
+          <a:prstGeom prst="rect">
+            <a:avLst/>
+          </a:prstGeom>
+          <a:noFill/>
+          <a:ln w="19050">
+            <a:solidFill>
+              <a:schemeClr val="tx1"/>
+            </a:solidFill>
+            <a:prstDash val="dash"/>
+          </a:ln>
+        </p:spPr>
+        <p:txBody>
+          <a:bodyPr wrap="square" rtlCol="0">
+            <a:spAutoFit/>
+          </a:bodyPr>
+          <a:lstStyle/>
+          <a:p>
+            <a:r>
+              <a:rPr lang="pt-BR" altLang="ko-KR" sz="1100" dirty="0">
+                <a:latin typeface="+mj-lt"/>
+              </a:rPr>
+              <a:t>Erick Lee;</a:t>
+            </a:r>
+          </a:p>
+          <a:p>
+            <a:r>
+              <a:rPr lang="pt-BR" altLang="ko-KR" sz="1100" dirty="0">
+                <a:latin typeface="+mj-lt"/>
+              </a:rPr>
+              <a:t>Gabriel da Silva;</a:t>
+            </a:r>
+          </a:p>
+          <a:p>
+            <a:r>
+              <a:rPr lang="pt-BR" altLang="ko-KR" sz="1100" dirty="0" err="1">
+                <a:latin typeface="+mj-lt"/>
+              </a:rPr>
+              <a:t>Jinwoo</a:t>
+            </a:r>
+            <a:r>
+              <a:rPr lang="pt-BR" altLang="ko-KR" sz="1100" dirty="0">
+                <a:latin typeface="+mj-lt"/>
+              </a:rPr>
+              <a:t> Kim;</a:t>
+            </a:r>
+          </a:p>
+          <a:p>
+            <a:r>
+              <a:rPr lang="pt-BR" altLang="ko-KR" sz="1100" dirty="0">
+                <a:latin typeface="+mj-lt"/>
+              </a:rPr>
+              <a:t>Lucas Aiello;</a:t>
+            </a:r>
+          </a:p>
+          <a:p>
+            <a:r>
+              <a:rPr lang="pt-BR" altLang="ko-KR" sz="1100" dirty="0">
+                <a:latin typeface="+mj-lt"/>
+              </a:rPr>
+              <a:t>Macari Marcelino;</a:t>
+            </a:r>
+          </a:p>
+          <a:p>
+            <a:r>
+              <a:rPr lang="pt-BR" altLang="ko-KR" sz="1100" dirty="0">
+                <a:latin typeface="+mj-lt"/>
+              </a:rPr>
+              <a:t>Vinicius Gonçalves</a:t>
+            </a:r>
+            <a:endParaRPr lang="ko-KR" altLang="en-US" sz="1100" dirty="0">
+              <a:latin typeface="+mj-lt"/>
+            </a:endParaRPr>
+          </a:p>
+        </p:txBody>
+      </p:sp>
+      <p:sp>
+        <p:nvSpPr>
+          <p:cNvPr id="5" name="CaixaDeTexto 4">
+            <a:extLst>
+              <a:ext uri="{FF2B5EF4-FFF2-40B4-BE49-F238E27FC236}">
+                <a16:creationId xmlns:a16="http://schemas.microsoft.com/office/drawing/2014/main" id="{4231A34C-DCA3-E657-5F41-7D3D375B6356}"/>
+              </a:ext>
+            </a:extLst>
+          </p:cNvPr>
+          <p:cNvSpPr txBox="1"/>
+          <p:nvPr/>
+        </p:nvSpPr>
+        <p:spPr>
+          <a:xfrm>
+            <a:off x="1073190" y="6067392"/>
+            <a:ext cx="10045617" cy="461665"/>
+          </a:xfrm>
+          <a:prstGeom prst="rect">
+            <a:avLst/>
+          </a:prstGeom>
+          <a:noFill/>
+        </p:spPr>
+        <p:txBody>
+          <a:bodyPr wrap="square" rtlCol="0">
+            <a:spAutoFit/>
+          </a:bodyPr>
+          <a:lstStyle/>
+          <a:p>
+            <a:pPr algn="ctr"/>
+            <a:r>
+              <a:rPr lang="pt-BR" altLang="ko-KR" sz="2400" dirty="0">
+                <a:latin typeface="Congenial SemiBold" panose="020F0502020204030204" pitchFamily="2" charset="0"/>
+              </a:rPr>
+              <a:t>Grupo 12</a:t>
+            </a:r>
+            <a:endParaRPr lang="ko-KR" altLang="en-US" sz="2400" dirty="0">
+              <a:latin typeface="Congenial SemiBold" panose="020F0502020204030204" pitchFamily="2" charset="0"/>
+            </a:endParaRPr>
+          </a:p>
+        </p:txBody>
+      </p:sp>
     </p:spTree>
     <p:extLst>
       <p:ext uri="{BB962C8B-B14F-4D97-AF65-F5344CB8AC3E}">

</xml_diff>